<commit_message>
All that is left is curses
</commit_message>
<xml_diff>
--- a/Board Games/Dungeon Scrawlers/Dungeon Scrawlers Pieces Print.pptx
+++ b/Board Games/Dungeon Scrawlers/Dungeon Scrawlers Pieces Print.pptx
@@ -111,12 +111,12 @@
     <p:sldId id="359" r:id="rId105"/>
     <p:sldId id="357" r:id="rId106"/>
     <p:sldId id="360" r:id="rId107"/>
-    <p:sldId id="381" r:id="rId108"/>
-    <p:sldId id="382" r:id="rId109"/>
-    <p:sldId id="383" r:id="rId110"/>
-    <p:sldId id="384" r:id="rId111"/>
+    <p:sldId id="393" r:id="rId108"/>
+    <p:sldId id="394" r:id="rId109"/>
+    <p:sldId id="381" r:id="rId110"/>
+    <p:sldId id="382" r:id="rId111"/>
     <p:sldId id="385" r:id="rId112"/>
-    <p:sldId id="386" r:id="rId113"/>
+    <p:sldId id="384" r:id="rId113"/>
     <p:sldId id="387" r:id="rId114"/>
     <p:sldId id="388" r:id="rId115"/>
     <p:sldId id="389" r:id="rId116"/>
@@ -4940,10 +4940,334 @@
           <a:chExt cx="0" cy="0"/>
         </a:xfrm>
       </p:grpSpPr>
+      <p:pic>
+        <p:nvPicPr>
+          <p:cNvPr id="3" name="Picture 2" descr="A screen shot of a game&#10;&#10;Description automatically generated">
+            <a:extLst>
+              <a:ext uri="{FF2B5EF4-FFF2-40B4-BE49-F238E27FC236}">
+                <a16:creationId xmlns:a16="http://schemas.microsoft.com/office/drawing/2014/main" id="{7A6233BA-BC91-7472-90D8-5B44C7EE8721}"/>
+              </a:ext>
+            </a:extLst>
+          </p:cNvPr>
+          <p:cNvPicPr>
+            <a:picLocks noChangeAspect="1"/>
+          </p:cNvPicPr>
+          <p:nvPr/>
+        </p:nvPicPr>
+        <p:blipFill>
+          <a:blip r:embed="rId2">
+            <a:extLst>
+              <a:ext uri="{28A0092B-C50C-407E-A947-70E740481C1C}">
+                <a14:useLocalDpi xmlns:a14="http://schemas.microsoft.com/office/drawing/2010/main" val="0"/>
+              </a:ext>
+            </a:extLst>
+          </a:blip>
+          <a:stretch>
+            <a:fillRect/>
+          </a:stretch>
+        </p:blipFill>
+        <p:spPr>
+          <a:xfrm>
+            <a:off x="5484870" y="0"/>
+            <a:ext cx="2287530" cy="3202542"/>
+          </a:xfrm>
+          <a:prstGeom prst="rect">
+            <a:avLst/>
+          </a:prstGeom>
+        </p:spPr>
+      </p:pic>
+      <p:pic>
+        <p:nvPicPr>
+          <p:cNvPr id="5" name="Picture 4" descr="A screen shot of a game&#10;&#10;Description automatically generated">
+            <a:extLst>
+              <a:ext uri="{FF2B5EF4-FFF2-40B4-BE49-F238E27FC236}">
+                <a16:creationId xmlns:a16="http://schemas.microsoft.com/office/drawing/2014/main" id="{BB344515-A234-BF79-E513-30F9A6C03197}"/>
+              </a:ext>
+            </a:extLst>
+          </p:cNvPr>
+          <p:cNvPicPr>
+            <a:picLocks noChangeAspect="1"/>
+          </p:cNvPicPr>
+          <p:nvPr/>
+        </p:nvPicPr>
+        <p:blipFill>
+          <a:blip r:embed="rId3">
+            <a:extLst>
+              <a:ext uri="{28A0092B-C50C-407E-A947-70E740481C1C}">
+                <a14:useLocalDpi xmlns:a14="http://schemas.microsoft.com/office/drawing/2010/main" val="0"/>
+              </a:ext>
+            </a:extLst>
+          </a:blip>
+          <a:stretch>
+            <a:fillRect/>
+          </a:stretch>
+        </p:blipFill>
+        <p:spPr>
+          <a:xfrm>
+            <a:off x="3244889" y="0"/>
+            <a:ext cx="2287530" cy="3202542"/>
+          </a:xfrm>
+          <a:prstGeom prst="rect">
+            <a:avLst/>
+          </a:prstGeom>
+        </p:spPr>
+      </p:pic>
+      <p:pic>
+        <p:nvPicPr>
+          <p:cNvPr id="7" name="Picture 6" descr="A screenshot of a video game&#10;&#10;Description automatically generated">
+            <a:extLst>
+              <a:ext uri="{FF2B5EF4-FFF2-40B4-BE49-F238E27FC236}">
+                <a16:creationId xmlns:a16="http://schemas.microsoft.com/office/drawing/2014/main" id="{72126C8B-9F6F-91BA-C4C6-42E6A0428FF5}"/>
+              </a:ext>
+            </a:extLst>
+          </p:cNvPr>
+          <p:cNvPicPr>
+            <a:picLocks noChangeAspect="1"/>
+          </p:cNvPicPr>
+          <p:nvPr/>
+        </p:nvPicPr>
+        <p:blipFill>
+          <a:blip r:embed="rId4">
+            <a:extLst>
+              <a:ext uri="{28A0092B-C50C-407E-A947-70E740481C1C}">
+                <a14:useLocalDpi xmlns:a14="http://schemas.microsoft.com/office/drawing/2010/main" val="0"/>
+              </a:ext>
+            </a:extLst>
+          </a:blip>
+          <a:stretch>
+            <a:fillRect/>
+          </a:stretch>
+        </p:blipFill>
+        <p:spPr>
+          <a:xfrm>
+            <a:off x="956753" y="0"/>
+            <a:ext cx="2288136" cy="3203390"/>
+          </a:xfrm>
+          <a:prstGeom prst="rect">
+            <a:avLst/>
+          </a:prstGeom>
+        </p:spPr>
+      </p:pic>
+      <p:pic>
+        <p:nvPicPr>
+          <p:cNvPr id="9" name="Picture 8" descr="A screen shot of a game&#10;&#10;Description automatically generated">
+            <a:extLst>
+              <a:ext uri="{FF2B5EF4-FFF2-40B4-BE49-F238E27FC236}">
+                <a16:creationId xmlns:a16="http://schemas.microsoft.com/office/drawing/2014/main" id="{9A792BE5-F5F9-6C7C-13CF-396CB97561C6}"/>
+              </a:ext>
+            </a:extLst>
+          </p:cNvPr>
+          <p:cNvPicPr>
+            <a:picLocks noChangeAspect="1"/>
+          </p:cNvPicPr>
+          <p:nvPr/>
+        </p:nvPicPr>
+        <p:blipFill>
+          <a:blip r:embed="rId5">
+            <a:extLst>
+              <a:ext uri="{28A0092B-C50C-407E-A947-70E740481C1C}">
+                <a14:useLocalDpi xmlns:a14="http://schemas.microsoft.com/office/drawing/2010/main" val="0"/>
+              </a:ext>
+            </a:extLst>
+          </a:blip>
+          <a:stretch>
+            <a:fillRect/>
+          </a:stretch>
+        </p:blipFill>
+        <p:spPr>
+          <a:xfrm>
+            <a:off x="5484870" y="3202542"/>
+            <a:ext cx="2288136" cy="3203390"/>
+          </a:xfrm>
+          <a:prstGeom prst="rect">
+            <a:avLst/>
+          </a:prstGeom>
+        </p:spPr>
+      </p:pic>
+      <p:pic>
+        <p:nvPicPr>
+          <p:cNvPr id="11" name="Picture 10" descr="A screenshot of a video game&#10;&#10;Description automatically generated">
+            <a:extLst>
+              <a:ext uri="{FF2B5EF4-FFF2-40B4-BE49-F238E27FC236}">
+                <a16:creationId xmlns:a16="http://schemas.microsoft.com/office/drawing/2014/main" id="{B640EBCD-71B9-23E7-A46B-7635F7C24D26}"/>
+              </a:ext>
+            </a:extLst>
+          </p:cNvPr>
+          <p:cNvPicPr>
+            <a:picLocks noChangeAspect="1"/>
+          </p:cNvPicPr>
+          <p:nvPr/>
+        </p:nvPicPr>
+        <p:blipFill>
+          <a:blip r:embed="rId6">
+            <a:extLst>
+              <a:ext uri="{28A0092B-C50C-407E-A947-70E740481C1C}">
+                <a14:useLocalDpi xmlns:a14="http://schemas.microsoft.com/office/drawing/2010/main" val="0"/>
+              </a:ext>
+            </a:extLst>
+          </a:blip>
+          <a:stretch>
+            <a:fillRect/>
+          </a:stretch>
+        </p:blipFill>
+        <p:spPr>
+          <a:xfrm>
+            <a:off x="3244889" y="3202542"/>
+            <a:ext cx="2288136" cy="3203390"/>
+          </a:xfrm>
+          <a:prstGeom prst="rect">
+            <a:avLst/>
+          </a:prstGeom>
+        </p:spPr>
+      </p:pic>
+      <p:pic>
+        <p:nvPicPr>
+          <p:cNvPr id="13" name="Picture 12" descr="A screenshot of a video game&#10;&#10;Description automatically generated">
+            <a:extLst>
+              <a:ext uri="{FF2B5EF4-FFF2-40B4-BE49-F238E27FC236}">
+                <a16:creationId xmlns:a16="http://schemas.microsoft.com/office/drawing/2014/main" id="{F30A1488-A6AD-C4F1-3987-59174B065BE3}"/>
+              </a:ext>
+            </a:extLst>
+          </p:cNvPr>
+          <p:cNvPicPr>
+            <a:picLocks noChangeAspect="1"/>
+          </p:cNvPicPr>
+          <p:nvPr/>
+        </p:nvPicPr>
+        <p:blipFill>
+          <a:blip r:embed="rId7">
+            <a:extLst>
+              <a:ext uri="{28A0092B-C50C-407E-A947-70E740481C1C}">
+                <a14:useLocalDpi xmlns:a14="http://schemas.microsoft.com/office/drawing/2010/main" val="0"/>
+              </a:ext>
+            </a:extLst>
+          </a:blip>
+          <a:stretch>
+            <a:fillRect/>
+          </a:stretch>
+        </p:blipFill>
+        <p:spPr>
+          <a:xfrm>
+            <a:off x="956753" y="3201694"/>
+            <a:ext cx="2288136" cy="3203390"/>
+          </a:xfrm>
+          <a:prstGeom prst="rect">
+            <a:avLst/>
+          </a:prstGeom>
+        </p:spPr>
+      </p:pic>
+      <p:pic>
+        <p:nvPicPr>
+          <p:cNvPr id="15" name="Picture 14" descr="A screen shot of a game&#10;&#10;Description automatically generated">
+            <a:extLst>
+              <a:ext uri="{FF2B5EF4-FFF2-40B4-BE49-F238E27FC236}">
+                <a16:creationId xmlns:a16="http://schemas.microsoft.com/office/drawing/2014/main" id="{0A562C61-8A17-C0D2-1BF5-BE4E6800DC50}"/>
+              </a:ext>
+            </a:extLst>
+          </p:cNvPr>
+          <p:cNvPicPr>
+            <a:picLocks noChangeAspect="1"/>
+          </p:cNvPicPr>
+          <p:nvPr/>
+        </p:nvPicPr>
+        <p:blipFill>
+          <a:blip r:embed="rId8">
+            <a:extLst>
+              <a:ext uri="{28A0092B-C50C-407E-A947-70E740481C1C}">
+                <a14:useLocalDpi xmlns:a14="http://schemas.microsoft.com/office/drawing/2010/main" val="0"/>
+              </a:ext>
+            </a:extLst>
+          </a:blip>
+          <a:stretch>
+            <a:fillRect/>
+          </a:stretch>
+        </p:blipFill>
+        <p:spPr>
+          <a:xfrm>
+            <a:off x="5484264" y="6405084"/>
+            <a:ext cx="2288136" cy="3203390"/>
+          </a:xfrm>
+          <a:prstGeom prst="rect">
+            <a:avLst/>
+          </a:prstGeom>
+        </p:spPr>
+      </p:pic>
+      <p:pic>
+        <p:nvPicPr>
+          <p:cNvPr id="17" name="Picture 16" descr="A screen shot of a game&#10;&#10;Description automatically generated">
+            <a:extLst>
+              <a:ext uri="{FF2B5EF4-FFF2-40B4-BE49-F238E27FC236}">
+                <a16:creationId xmlns:a16="http://schemas.microsoft.com/office/drawing/2014/main" id="{329B653A-322D-E00B-F722-FA9C4C51B773}"/>
+              </a:ext>
+            </a:extLst>
+          </p:cNvPr>
+          <p:cNvPicPr>
+            <a:picLocks noChangeAspect="1"/>
+          </p:cNvPicPr>
+          <p:nvPr/>
+        </p:nvPicPr>
+        <p:blipFill>
+          <a:blip r:embed="rId9">
+            <a:extLst>
+              <a:ext uri="{28A0092B-C50C-407E-A947-70E740481C1C}">
+                <a14:useLocalDpi xmlns:a14="http://schemas.microsoft.com/office/drawing/2010/main" val="0"/>
+              </a:ext>
+            </a:extLst>
+          </a:blip>
+          <a:stretch>
+            <a:fillRect/>
+          </a:stretch>
+        </p:blipFill>
+        <p:spPr>
+          <a:xfrm>
+            <a:off x="3221418" y="6405508"/>
+            <a:ext cx="2287530" cy="3202542"/>
+          </a:xfrm>
+          <a:prstGeom prst="rect">
+            <a:avLst/>
+          </a:prstGeom>
+        </p:spPr>
+      </p:pic>
+      <p:pic>
+        <p:nvPicPr>
+          <p:cNvPr id="19" name="Picture 18" descr="A screenshot of a video game&#10;&#10;Description automatically generated">
+            <a:extLst>
+              <a:ext uri="{FF2B5EF4-FFF2-40B4-BE49-F238E27FC236}">
+                <a16:creationId xmlns:a16="http://schemas.microsoft.com/office/drawing/2014/main" id="{DAEB7784-E6B6-8C3D-C956-B373FB6ED053}"/>
+              </a:ext>
+            </a:extLst>
+          </p:cNvPr>
+          <p:cNvPicPr>
+            <a:picLocks noChangeAspect="1"/>
+          </p:cNvPicPr>
+          <p:nvPr/>
+        </p:nvPicPr>
+        <p:blipFill>
+          <a:blip r:embed="rId10">
+            <a:extLst>
+              <a:ext uri="{28A0092B-C50C-407E-A947-70E740481C1C}">
+                <a14:useLocalDpi xmlns:a14="http://schemas.microsoft.com/office/drawing/2010/main" val="0"/>
+              </a:ext>
+            </a:extLst>
+          </a:blip>
+          <a:stretch>
+            <a:fillRect/>
+          </a:stretch>
+        </p:blipFill>
+        <p:spPr>
+          <a:xfrm>
+            <a:off x="956450" y="6404660"/>
+            <a:ext cx="2288742" cy="3204238"/>
+          </a:xfrm>
+          <a:prstGeom prst="rect">
+            <a:avLst/>
+          </a:prstGeom>
+        </p:spPr>
+      </p:pic>
     </p:spTree>
     <p:extLst>
       <p:ext uri="{BB962C8B-B14F-4D97-AF65-F5344CB8AC3E}">
-        <p14:creationId xmlns:p14="http://schemas.microsoft.com/office/powerpoint/2010/main" val="4249916322"/>
+        <p14:creationId xmlns:p14="http://schemas.microsoft.com/office/powerpoint/2010/main" val="2376703203"/>
       </p:ext>
     </p:extLst>
   </p:cSld>
@@ -4972,46 +5296,10 @@
       </p:grpSpPr>
       <p:pic>
         <p:nvPicPr>
-          <p:cNvPr id="3" name="Picture 2" descr="A screen shot of a video game&#10;&#10;Description automatically generated">
-            <a:extLst>
-              <a:ext uri="{FF2B5EF4-FFF2-40B4-BE49-F238E27FC236}">
-                <a16:creationId xmlns:a16="http://schemas.microsoft.com/office/drawing/2014/main" id="{7EBEE700-73D5-DF5E-CFAD-06261E50D857}"/>
-              </a:ext>
-            </a:extLst>
-          </p:cNvPr>
-          <p:cNvPicPr>
-            <a:picLocks noChangeAspect="1"/>
-          </p:cNvPicPr>
-          <p:nvPr/>
-        </p:nvPicPr>
-        <p:blipFill>
-          <a:blip r:embed="rId2">
-            <a:extLst>
-              <a:ext uri="{28A0092B-C50C-407E-A947-70E740481C1C}">
-                <a14:useLocalDpi xmlns:a14="http://schemas.microsoft.com/office/drawing/2010/main" val="0"/>
-              </a:ext>
-            </a:extLst>
-          </a:blip>
-          <a:stretch>
-            <a:fillRect/>
-          </a:stretch>
-        </p:blipFill>
-        <p:spPr>
-          <a:xfrm>
-            <a:off x="0" y="0"/>
-            <a:ext cx="2286924" cy="3201694"/>
-          </a:xfrm>
-          <a:prstGeom prst="rect">
-            <a:avLst/>
-          </a:prstGeom>
-        </p:spPr>
-      </p:pic>
-      <p:pic>
-        <p:nvPicPr>
-          <p:cNvPr id="5" name="Picture 4" descr="A screen shot of a video game&#10;&#10;Description automatically generated">
-            <a:extLst>
-              <a:ext uri="{FF2B5EF4-FFF2-40B4-BE49-F238E27FC236}">
-                <a16:creationId xmlns:a16="http://schemas.microsoft.com/office/drawing/2014/main" id="{7AF1B9AE-9901-0E3C-2F69-58664E9BD907}"/>
+          <p:cNvPr id="5" name="Picture 4" descr="A screen shot of a game&#10;&#10;Description automatically generated">
+            <a:extLst>
+              <a:ext uri="{FF2B5EF4-FFF2-40B4-BE49-F238E27FC236}">
+                <a16:creationId xmlns:a16="http://schemas.microsoft.com/office/drawing/2014/main" id="{B852166A-B81F-F98E-27AA-C6358CB65B89}"/>
               </a:ext>
             </a:extLst>
           </p:cNvPr>
@@ -5044,10 +5332,10 @@
       </p:pic>
       <p:pic>
         <p:nvPicPr>
-          <p:cNvPr id="7" name="Picture 6" descr="A screen shot of a video game&#10;&#10;Description automatically generated">
-            <a:extLst>
-              <a:ext uri="{FF2B5EF4-FFF2-40B4-BE49-F238E27FC236}">
-                <a16:creationId xmlns:a16="http://schemas.microsoft.com/office/drawing/2014/main" id="{2B7B606C-625F-4B42-7051-CC074D1C151C}"/>
+          <p:cNvPr id="7" name="Picture 6" descr="A screen shot of a game&#10;&#10;Description automatically generated">
+            <a:extLst>
+              <a:ext uri="{FF2B5EF4-FFF2-40B4-BE49-F238E27FC236}">
+                <a16:creationId xmlns:a16="http://schemas.microsoft.com/office/drawing/2014/main" id="{531514E4-B151-345C-DFF5-1E13A9639651}"/>
               </a:ext>
             </a:extLst>
           </p:cNvPr>
@@ -5080,10 +5368,10 @@
       </p:pic>
       <p:pic>
         <p:nvPicPr>
-          <p:cNvPr id="8" name="Picture 7" descr="A screen shot of a video game&#10;&#10;Description automatically generated">
-            <a:extLst>
-              <a:ext uri="{FF2B5EF4-FFF2-40B4-BE49-F238E27FC236}">
-                <a16:creationId xmlns:a16="http://schemas.microsoft.com/office/drawing/2014/main" id="{109A92B2-06EC-DF8A-04D3-EA17304E3618}"/>
+          <p:cNvPr id="9" name="Picture 8" descr="A screen shot of a game&#10;&#10;Description automatically generated">
+            <a:extLst>
+              <a:ext uri="{FF2B5EF4-FFF2-40B4-BE49-F238E27FC236}">
+                <a16:creationId xmlns:a16="http://schemas.microsoft.com/office/drawing/2014/main" id="{B14A6E61-2AC9-9A06-B0BA-15A10924143E}"/>
               </a:ext>
             </a:extLst>
           </p:cNvPr>
@@ -5116,10 +5404,10 @@
       </p:pic>
       <p:pic>
         <p:nvPicPr>
-          <p:cNvPr id="9" name="Picture 8" descr="A screen shot of a video game&#10;&#10;Description automatically generated">
-            <a:extLst>
-              <a:ext uri="{FF2B5EF4-FFF2-40B4-BE49-F238E27FC236}">
-                <a16:creationId xmlns:a16="http://schemas.microsoft.com/office/drawing/2014/main" id="{9E8FE4E7-1F0E-EC3B-C461-35BE051A3031}"/>
+          <p:cNvPr id="11" name="Picture 10" descr="A screen shot of a game&#10;&#10;Description automatically generated">
+            <a:extLst>
+              <a:ext uri="{FF2B5EF4-FFF2-40B4-BE49-F238E27FC236}">
+                <a16:creationId xmlns:a16="http://schemas.microsoft.com/office/drawing/2014/main" id="{B5B4693F-241B-5527-18C6-1106334D8E8B}"/>
               </a:ext>
             </a:extLst>
           </p:cNvPr>
@@ -5152,10 +5440,10 @@
       </p:pic>
       <p:pic>
         <p:nvPicPr>
-          <p:cNvPr id="10" name="Picture 9" descr="A screen shot of a video game&#10;&#10;Description automatically generated">
-            <a:extLst>
-              <a:ext uri="{FF2B5EF4-FFF2-40B4-BE49-F238E27FC236}">
-                <a16:creationId xmlns:a16="http://schemas.microsoft.com/office/drawing/2014/main" id="{7A31FC00-028C-6C28-F490-201AEFB8526B}"/>
+          <p:cNvPr id="13" name="Picture 12" descr="A screen shot of a game&#10;&#10;Description automatically generated">
+            <a:extLst>
+              <a:ext uri="{FF2B5EF4-FFF2-40B4-BE49-F238E27FC236}">
+                <a16:creationId xmlns:a16="http://schemas.microsoft.com/office/drawing/2014/main" id="{D9519CDA-A91F-D22E-CD58-48EC3C7E13D8}"/>
               </a:ext>
             </a:extLst>
           </p:cNvPr>
@@ -5188,10 +5476,10 @@
       </p:pic>
       <p:pic>
         <p:nvPicPr>
-          <p:cNvPr id="11" name="Picture 10" descr="A screen shot of a video game&#10;&#10;Description automatically generated">
-            <a:extLst>
-              <a:ext uri="{FF2B5EF4-FFF2-40B4-BE49-F238E27FC236}">
-                <a16:creationId xmlns:a16="http://schemas.microsoft.com/office/drawing/2014/main" id="{E2C05A01-A53F-CF48-DC0A-3AD630C56068}"/>
+          <p:cNvPr id="15" name="Picture 14" descr="A screen shot of a game&#10;&#10;Description automatically generated">
+            <a:extLst>
+              <a:ext uri="{FF2B5EF4-FFF2-40B4-BE49-F238E27FC236}">
+                <a16:creationId xmlns:a16="http://schemas.microsoft.com/office/drawing/2014/main" id="{6C666561-1D0B-A8AF-7C4E-937B8358993B}"/>
               </a:ext>
             </a:extLst>
           </p:cNvPr>
@@ -5224,10 +5512,10 @@
       </p:pic>
       <p:pic>
         <p:nvPicPr>
-          <p:cNvPr id="12" name="Picture 11" descr="A screen shot of a video game&#10;&#10;Description automatically generated">
-            <a:extLst>
-              <a:ext uri="{FF2B5EF4-FFF2-40B4-BE49-F238E27FC236}">
-                <a16:creationId xmlns:a16="http://schemas.microsoft.com/office/drawing/2014/main" id="{48229908-E2CA-7ED5-7A81-F09FC2FE0FF7}"/>
+          <p:cNvPr id="17" name="Picture 16" descr="A screen shot of a game&#10;&#10;Description automatically generated">
+            <a:extLst>
+              <a:ext uri="{FF2B5EF4-FFF2-40B4-BE49-F238E27FC236}">
+                <a16:creationId xmlns:a16="http://schemas.microsoft.com/office/drawing/2014/main" id="{958CF5CC-6EC9-A277-CBAE-D0095667E4EB}"/>
               </a:ext>
             </a:extLst>
           </p:cNvPr>
@@ -5260,10 +5548,10 @@
       </p:pic>
       <p:pic>
         <p:nvPicPr>
-          <p:cNvPr id="13" name="Picture 12" descr="A screen shot of a video game&#10;&#10;Description automatically generated">
-            <a:extLst>
-              <a:ext uri="{FF2B5EF4-FFF2-40B4-BE49-F238E27FC236}">
-                <a16:creationId xmlns:a16="http://schemas.microsoft.com/office/drawing/2014/main" id="{C9FE1C40-DD30-8D07-4D27-068B97B0145E}"/>
+          <p:cNvPr id="19" name="Picture 18" descr="A screen shot of a game&#10;&#10;Description automatically generated">
+            <a:extLst>
+              <a:ext uri="{FF2B5EF4-FFF2-40B4-BE49-F238E27FC236}">
+                <a16:creationId xmlns:a16="http://schemas.microsoft.com/office/drawing/2014/main" id="{C8DC9309-F077-07A9-D034-A7461718C164}"/>
               </a:ext>
             </a:extLst>
           </p:cNvPr>
@@ -5287,6 +5575,42 @@
         <p:spPr>
           <a:xfrm>
             <a:off x="4573848" y="6403388"/>
+            <a:ext cx="2286924" cy="3201694"/>
+          </a:xfrm>
+          <a:prstGeom prst="rect">
+            <a:avLst/>
+          </a:prstGeom>
+        </p:spPr>
+      </p:pic>
+      <p:pic>
+        <p:nvPicPr>
+          <p:cNvPr id="4" name="Picture 3" descr="A screen shot of a game&#10;&#10;Description automatically generated">
+            <a:extLst>
+              <a:ext uri="{FF2B5EF4-FFF2-40B4-BE49-F238E27FC236}">
+                <a16:creationId xmlns:a16="http://schemas.microsoft.com/office/drawing/2014/main" id="{0DF2B6A8-705B-7996-0910-FDD0EE74EFCD}"/>
+              </a:ext>
+            </a:extLst>
+          </p:cNvPr>
+          <p:cNvPicPr>
+            <a:picLocks noChangeAspect="1"/>
+          </p:cNvPicPr>
+          <p:nvPr/>
+        </p:nvPicPr>
+        <p:blipFill>
+          <a:blip r:embed="rId2">
+            <a:extLst>
+              <a:ext uri="{28A0092B-C50C-407E-A947-70E740481C1C}">
+                <a14:useLocalDpi xmlns:a14="http://schemas.microsoft.com/office/drawing/2010/main" val="0"/>
+              </a:ext>
+            </a:extLst>
+          </a:blip>
+          <a:stretch>
+            <a:fillRect/>
+          </a:stretch>
+        </p:blipFill>
+        <p:spPr>
+          <a:xfrm>
+            <a:off x="0" y="7257"/>
             <a:ext cx="2286924" cy="3201694"/>
           </a:xfrm>
           <a:prstGeom prst="rect">
@@ -5297,7 +5621,7 @@
     </p:spTree>
     <p:extLst>
       <p:ext uri="{BB962C8B-B14F-4D97-AF65-F5344CB8AC3E}">
-        <p14:creationId xmlns:p14="http://schemas.microsoft.com/office/powerpoint/2010/main" val="2731334957"/>
+        <p14:creationId xmlns:p14="http://schemas.microsoft.com/office/powerpoint/2010/main" val="2069781167"/>
       </p:ext>
     </p:extLst>
   </p:cSld>
@@ -5327,7 +5651,7 @@
     </p:spTree>
     <p:extLst>
       <p:ext uri="{BB962C8B-B14F-4D97-AF65-F5344CB8AC3E}">
-        <p14:creationId xmlns:p14="http://schemas.microsoft.com/office/powerpoint/2010/main" val="3105389301"/>
+        <p14:creationId xmlns:p14="http://schemas.microsoft.com/office/powerpoint/2010/main" val="4249916322"/>
       </p:ext>
     </p:extLst>
   </p:cSld>
@@ -6073,7 +6397,7 @@
           <p:cNvPr id="3" name="Picture 2" descr="A screen shot of a video game&#10;&#10;Description automatically generated">
             <a:extLst>
               <a:ext uri="{FF2B5EF4-FFF2-40B4-BE49-F238E27FC236}">
-                <a16:creationId xmlns:a16="http://schemas.microsoft.com/office/drawing/2014/main" id="{6C2AC824-68F4-8EB5-E0B1-614EBFC13C5E}"/>
+                <a16:creationId xmlns:a16="http://schemas.microsoft.com/office/drawing/2014/main" id="{7EBEE700-73D5-DF5E-CFAD-06261E50D857}"/>
               </a:ext>
             </a:extLst>
           </p:cNvPr>
@@ -6106,20 +6430,20 @@
       </p:pic>
       <p:pic>
         <p:nvPicPr>
-          <p:cNvPr id="5" name="Picture 4" descr="A screen shot of a game&#10;&#10;Description automatically generated">
-            <a:extLst>
-              <a:ext uri="{FF2B5EF4-FFF2-40B4-BE49-F238E27FC236}">
-                <a16:creationId xmlns:a16="http://schemas.microsoft.com/office/drawing/2014/main" id="{B852166A-B81F-F98E-27AA-C6358CB65B89}"/>
-              </a:ext>
-            </a:extLst>
-          </p:cNvPr>
-          <p:cNvPicPr>
-            <a:picLocks noChangeAspect="1"/>
-          </p:cNvPicPr>
-          <p:nvPr/>
-        </p:nvPicPr>
-        <p:blipFill>
-          <a:blip r:embed="rId3">
+          <p:cNvPr id="5" name="Picture 4" descr="A screen shot of a video game&#10;&#10;Description automatically generated">
+            <a:extLst>
+              <a:ext uri="{FF2B5EF4-FFF2-40B4-BE49-F238E27FC236}">
+                <a16:creationId xmlns:a16="http://schemas.microsoft.com/office/drawing/2014/main" id="{7AF1B9AE-9901-0E3C-2F69-58664E9BD907}"/>
+              </a:ext>
+            </a:extLst>
+          </p:cNvPr>
+          <p:cNvPicPr>
+            <a:picLocks noChangeAspect="1"/>
+          </p:cNvPicPr>
+          <p:nvPr/>
+        </p:nvPicPr>
+        <p:blipFill>
+          <a:blip r:embed="rId2">
             <a:extLst>
               <a:ext uri="{28A0092B-C50C-407E-A947-70E740481C1C}">
                 <a14:useLocalDpi xmlns:a14="http://schemas.microsoft.com/office/drawing/2010/main" val="0"/>
@@ -6142,20 +6466,20 @@
       </p:pic>
       <p:pic>
         <p:nvPicPr>
-          <p:cNvPr id="7" name="Picture 6" descr="A screen shot of a game&#10;&#10;Description automatically generated">
-            <a:extLst>
-              <a:ext uri="{FF2B5EF4-FFF2-40B4-BE49-F238E27FC236}">
-                <a16:creationId xmlns:a16="http://schemas.microsoft.com/office/drawing/2014/main" id="{531514E4-B151-345C-DFF5-1E13A9639651}"/>
-              </a:ext>
-            </a:extLst>
-          </p:cNvPr>
-          <p:cNvPicPr>
-            <a:picLocks noChangeAspect="1"/>
-          </p:cNvPicPr>
-          <p:nvPr/>
-        </p:nvPicPr>
-        <p:blipFill>
-          <a:blip r:embed="rId3">
+          <p:cNvPr id="7" name="Picture 6" descr="A screen shot of a video game&#10;&#10;Description automatically generated">
+            <a:extLst>
+              <a:ext uri="{FF2B5EF4-FFF2-40B4-BE49-F238E27FC236}">
+                <a16:creationId xmlns:a16="http://schemas.microsoft.com/office/drawing/2014/main" id="{2B7B606C-625F-4B42-7051-CC074D1C151C}"/>
+              </a:ext>
+            </a:extLst>
+          </p:cNvPr>
+          <p:cNvPicPr>
+            <a:picLocks noChangeAspect="1"/>
+          </p:cNvPicPr>
+          <p:nvPr/>
+        </p:nvPicPr>
+        <p:blipFill>
+          <a:blip r:embed="rId2">
             <a:extLst>
               <a:ext uri="{28A0092B-C50C-407E-A947-70E740481C1C}">
                 <a14:useLocalDpi xmlns:a14="http://schemas.microsoft.com/office/drawing/2010/main" val="0"/>
@@ -6178,20 +6502,20 @@
       </p:pic>
       <p:pic>
         <p:nvPicPr>
-          <p:cNvPr id="9" name="Picture 8" descr="A screen shot of a game&#10;&#10;Description automatically generated">
-            <a:extLst>
-              <a:ext uri="{FF2B5EF4-FFF2-40B4-BE49-F238E27FC236}">
-                <a16:creationId xmlns:a16="http://schemas.microsoft.com/office/drawing/2014/main" id="{B14A6E61-2AC9-9A06-B0BA-15A10924143E}"/>
-              </a:ext>
-            </a:extLst>
-          </p:cNvPr>
-          <p:cNvPicPr>
-            <a:picLocks noChangeAspect="1"/>
-          </p:cNvPicPr>
-          <p:nvPr/>
-        </p:nvPicPr>
-        <p:blipFill>
-          <a:blip r:embed="rId3">
+          <p:cNvPr id="8" name="Picture 7" descr="A screen shot of a video game&#10;&#10;Description automatically generated">
+            <a:extLst>
+              <a:ext uri="{FF2B5EF4-FFF2-40B4-BE49-F238E27FC236}">
+                <a16:creationId xmlns:a16="http://schemas.microsoft.com/office/drawing/2014/main" id="{109A92B2-06EC-DF8A-04D3-EA17304E3618}"/>
+              </a:ext>
+            </a:extLst>
+          </p:cNvPr>
+          <p:cNvPicPr>
+            <a:picLocks noChangeAspect="1"/>
+          </p:cNvPicPr>
+          <p:nvPr/>
+        </p:nvPicPr>
+        <p:blipFill>
+          <a:blip r:embed="rId2">
             <a:extLst>
               <a:ext uri="{28A0092B-C50C-407E-A947-70E740481C1C}">
                 <a14:useLocalDpi xmlns:a14="http://schemas.microsoft.com/office/drawing/2010/main" val="0"/>
@@ -6214,20 +6538,20 @@
       </p:pic>
       <p:pic>
         <p:nvPicPr>
-          <p:cNvPr id="11" name="Picture 10" descr="A screen shot of a game&#10;&#10;Description automatically generated">
-            <a:extLst>
-              <a:ext uri="{FF2B5EF4-FFF2-40B4-BE49-F238E27FC236}">
-                <a16:creationId xmlns:a16="http://schemas.microsoft.com/office/drawing/2014/main" id="{B5B4693F-241B-5527-18C6-1106334D8E8B}"/>
-              </a:ext>
-            </a:extLst>
-          </p:cNvPr>
-          <p:cNvPicPr>
-            <a:picLocks noChangeAspect="1"/>
-          </p:cNvPicPr>
-          <p:nvPr/>
-        </p:nvPicPr>
-        <p:blipFill>
-          <a:blip r:embed="rId3">
+          <p:cNvPr id="9" name="Picture 8" descr="A screen shot of a video game&#10;&#10;Description automatically generated">
+            <a:extLst>
+              <a:ext uri="{FF2B5EF4-FFF2-40B4-BE49-F238E27FC236}">
+                <a16:creationId xmlns:a16="http://schemas.microsoft.com/office/drawing/2014/main" id="{9E8FE4E7-1F0E-EC3B-C461-35BE051A3031}"/>
+              </a:ext>
+            </a:extLst>
+          </p:cNvPr>
+          <p:cNvPicPr>
+            <a:picLocks noChangeAspect="1"/>
+          </p:cNvPicPr>
+          <p:nvPr/>
+        </p:nvPicPr>
+        <p:blipFill>
+          <a:blip r:embed="rId2">
             <a:extLst>
               <a:ext uri="{28A0092B-C50C-407E-A947-70E740481C1C}">
                 <a14:useLocalDpi xmlns:a14="http://schemas.microsoft.com/office/drawing/2010/main" val="0"/>
@@ -6250,20 +6574,20 @@
       </p:pic>
       <p:pic>
         <p:nvPicPr>
-          <p:cNvPr id="13" name="Picture 12" descr="A screen shot of a game&#10;&#10;Description automatically generated">
-            <a:extLst>
-              <a:ext uri="{FF2B5EF4-FFF2-40B4-BE49-F238E27FC236}">
-                <a16:creationId xmlns:a16="http://schemas.microsoft.com/office/drawing/2014/main" id="{D9519CDA-A91F-D22E-CD58-48EC3C7E13D8}"/>
-              </a:ext>
-            </a:extLst>
-          </p:cNvPr>
-          <p:cNvPicPr>
-            <a:picLocks noChangeAspect="1"/>
-          </p:cNvPicPr>
-          <p:nvPr/>
-        </p:nvPicPr>
-        <p:blipFill>
-          <a:blip r:embed="rId3">
+          <p:cNvPr id="10" name="Picture 9" descr="A screen shot of a video game&#10;&#10;Description automatically generated">
+            <a:extLst>
+              <a:ext uri="{FF2B5EF4-FFF2-40B4-BE49-F238E27FC236}">
+                <a16:creationId xmlns:a16="http://schemas.microsoft.com/office/drawing/2014/main" id="{7A31FC00-028C-6C28-F490-201AEFB8526B}"/>
+              </a:ext>
+            </a:extLst>
+          </p:cNvPr>
+          <p:cNvPicPr>
+            <a:picLocks noChangeAspect="1"/>
+          </p:cNvPicPr>
+          <p:nvPr/>
+        </p:nvPicPr>
+        <p:blipFill>
+          <a:blip r:embed="rId2">
             <a:extLst>
               <a:ext uri="{28A0092B-C50C-407E-A947-70E740481C1C}">
                 <a14:useLocalDpi xmlns:a14="http://schemas.microsoft.com/office/drawing/2010/main" val="0"/>
@@ -6286,20 +6610,20 @@
       </p:pic>
       <p:pic>
         <p:nvPicPr>
-          <p:cNvPr id="15" name="Picture 14" descr="A screen shot of a game&#10;&#10;Description automatically generated">
-            <a:extLst>
-              <a:ext uri="{FF2B5EF4-FFF2-40B4-BE49-F238E27FC236}">
-                <a16:creationId xmlns:a16="http://schemas.microsoft.com/office/drawing/2014/main" id="{6C666561-1D0B-A8AF-7C4E-937B8358993B}"/>
-              </a:ext>
-            </a:extLst>
-          </p:cNvPr>
-          <p:cNvPicPr>
-            <a:picLocks noChangeAspect="1"/>
-          </p:cNvPicPr>
-          <p:nvPr/>
-        </p:nvPicPr>
-        <p:blipFill>
-          <a:blip r:embed="rId3">
+          <p:cNvPr id="11" name="Picture 10" descr="A screen shot of a video game&#10;&#10;Description automatically generated">
+            <a:extLst>
+              <a:ext uri="{FF2B5EF4-FFF2-40B4-BE49-F238E27FC236}">
+                <a16:creationId xmlns:a16="http://schemas.microsoft.com/office/drawing/2014/main" id="{E2C05A01-A53F-CF48-DC0A-3AD630C56068}"/>
+              </a:ext>
+            </a:extLst>
+          </p:cNvPr>
+          <p:cNvPicPr>
+            <a:picLocks noChangeAspect="1"/>
+          </p:cNvPicPr>
+          <p:nvPr/>
+        </p:nvPicPr>
+        <p:blipFill>
+          <a:blip r:embed="rId2">
             <a:extLst>
               <a:ext uri="{28A0092B-C50C-407E-A947-70E740481C1C}">
                 <a14:useLocalDpi xmlns:a14="http://schemas.microsoft.com/office/drawing/2010/main" val="0"/>
@@ -6322,20 +6646,20 @@
       </p:pic>
       <p:pic>
         <p:nvPicPr>
-          <p:cNvPr id="17" name="Picture 16" descr="A screen shot of a game&#10;&#10;Description automatically generated">
-            <a:extLst>
-              <a:ext uri="{FF2B5EF4-FFF2-40B4-BE49-F238E27FC236}">
-                <a16:creationId xmlns:a16="http://schemas.microsoft.com/office/drawing/2014/main" id="{958CF5CC-6EC9-A277-CBAE-D0095667E4EB}"/>
-              </a:ext>
-            </a:extLst>
-          </p:cNvPr>
-          <p:cNvPicPr>
-            <a:picLocks noChangeAspect="1"/>
-          </p:cNvPicPr>
-          <p:nvPr/>
-        </p:nvPicPr>
-        <p:blipFill>
-          <a:blip r:embed="rId3">
+          <p:cNvPr id="12" name="Picture 11" descr="A screen shot of a video game&#10;&#10;Description automatically generated">
+            <a:extLst>
+              <a:ext uri="{FF2B5EF4-FFF2-40B4-BE49-F238E27FC236}">
+                <a16:creationId xmlns:a16="http://schemas.microsoft.com/office/drawing/2014/main" id="{48229908-E2CA-7ED5-7A81-F09FC2FE0FF7}"/>
+              </a:ext>
+            </a:extLst>
+          </p:cNvPr>
+          <p:cNvPicPr>
+            <a:picLocks noChangeAspect="1"/>
+          </p:cNvPicPr>
+          <p:nvPr/>
+        </p:nvPicPr>
+        <p:blipFill>
+          <a:blip r:embed="rId2">
             <a:extLst>
               <a:ext uri="{28A0092B-C50C-407E-A947-70E740481C1C}">
                 <a14:useLocalDpi xmlns:a14="http://schemas.microsoft.com/office/drawing/2010/main" val="0"/>
@@ -6358,20 +6682,20 @@
       </p:pic>
       <p:pic>
         <p:nvPicPr>
-          <p:cNvPr id="19" name="Picture 18" descr="A screen shot of a game&#10;&#10;Description automatically generated">
-            <a:extLst>
-              <a:ext uri="{FF2B5EF4-FFF2-40B4-BE49-F238E27FC236}">
-                <a16:creationId xmlns:a16="http://schemas.microsoft.com/office/drawing/2014/main" id="{C8DC9309-F077-07A9-D034-A7461718C164}"/>
-              </a:ext>
-            </a:extLst>
-          </p:cNvPr>
-          <p:cNvPicPr>
-            <a:picLocks noChangeAspect="1"/>
-          </p:cNvPicPr>
-          <p:nvPr/>
-        </p:nvPicPr>
-        <p:blipFill>
-          <a:blip r:embed="rId3">
+          <p:cNvPr id="13" name="Picture 12" descr="A screen shot of a video game&#10;&#10;Description automatically generated">
+            <a:extLst>
+              <a:ext uri="{FF2B5EF4-FFF2-40B4-BE49-F238E27FC236}">
+                <a16:creationId xmlns:a16="http://schemas.microsoft.com/office/drawing/2014/main" id="{C9FE1C40-DD30-8D07-4D27-068B97B0145E}"/>
+              </a:ext>
+            </a:extLst>
+          </p:cNvPr>
+          <p:cNvPicPr>
+            <a:picLocks noChangeAspect="1"/>
+          </p:cNvPicPr>
+          <p:nvPr/>
+        </p:nvPicPr>
+        <p:blipFill>
+          <a:blip r:embed="rId2">
             <a:extLst>
               <a:ext uri="{28A0092B-C50C-407E-A947-70E740481C1C}">
                 <a14:useLocalDpi xmlns:a14="http://schemas.microsoft.com/office/drawing/2010/main" val="0"/>
@@ -6395,7 +6719,7 @@
     </p:spTree>
     <p:extLst>
       <p:ext uri="{BB962C8B-B14F-4D97-AF65-F5344CB8AC3E}">
-        <p14:creationId xmlns:p14="http://schemas.microsoft.com/office/powerpoint/2010/main" val="2426942407"/>
+        <p14:creationId xmlns:p14="http://schemas.microsoft.com/office/powerpoint/2010/main" val="2731334957"/>
       </p:ext>
     </p:extLst>
   </p:cSld>
@@ -6422,6 +6746,294 @@
           <a:chExt cx="0" cy="0"/>
         </a:xfrm>
       </p:grpSpPr>
+      <p:pic>
+        <p:nvPicPr>
+          <p:cNvPr id="21" name="Picture 20" descr="A screen shot of a video game&#10;&#10;Description automatically generated">
+            <a:extLst>
+              <a:ext uri="{FF2B5EF4-FFF2-40B4-BE49-F238E27FC236}">
+                <a16:creationId xmlns:a16="http://schemas.microsoft.com/office/drawing/2014/main" id="{F4459F78-C47D-55C2-3B04-31E0E509C3F5}"/>
+              </a:ext>
+            </a:extLst>
+          </p:cNvPr>
+          <p:cNvPicPr>
+            <a:picLocks noChangeAspect="1"/>
+          </p:cNvPicPr>
+          <p:nvPr/>
+        </p:nvPicPr>
+        <p:blipFill>
+          <a:blip r:embed="rId2">
+            <a:extLst>
+              <a:ext uri="{28A0092B-C50C-407E-A947-70E740481C1C}">
+                <a14:useLocalDpi xmlns:a14="http://schemas.microsoft.com/office/drawing/2010/main" val="0"/>
+              </a:ext>
+            </a:extLst>
+          </a:blip>
+          <a:stretch>
+            <a:fillRect/>
+          </a:stretch>
+        </p:blipFill>
+        <p:spPr>
+          <a:xfrm>
+            <a:off x="909810" y="0"/>
+            <a:ext cx="2287530" cy="3202542"/>
+          </a:xfrm>
+          <a:prstGeom prst="rect">
+            <a:avLst/>
+          </a:prstGeom>
+        </p:spPr>
+      </p:pic>
+      <p:pic>
+        <p:nvPicPr>
+          <p:cNvPr id="23" name="Picture 22" descr="A screenshot of a video game&#10;&#10;Description automatically generated">
+            <a:extLst>
+              <a:ext uri="{FF2B5EF4-FFF2-40B4-BE49-F238E27FC236}">
+                <a16:creationId xmlns:a16="http://schemas.microsoft.com/office/drawing/2014/main" id="{CAF724AA-67D9-3745-4246-F05BE738FA8C}"/>
+              </a:ext>
+            </a:extLst>
+          </p:cNvPr>
+          <p:cNvPicPr>
+            <a:picLocks noChangeAspect="1"/>
+          </p:cNvPicPr>
+          <p:nvPr/>
+        </p:nvPicPr>
+        <p:blipFill>
+          <a:blip r:embed="rId3">
+            <a:extLst>
+              <a:ext uri="{28A0092B-C50C-407E-A947-70E740481C1C}">
+                <a14:useLocalDpi xmlns:a14="http://schemas.microsoft.com/office/drawing/2010/main" val="0"/>
+              </a:ext>
+            </a:extLst>
+          </a:blip>
+          <a:stretch>
+            <a:fillRect/>
+          </a:stretch>
+        </p:blipFill>
+        <p:spPr>
+          <a:xfrm>
+            <a:off x="3197340" y="0"/>
+            <a:ext cx="2287530" cy="3202542"/>
+          </a:xfrm>
+          <a:prstGeom prst="rect">
+            <a:avLst/>
+          </a:prstGeom>
+        </p:spPr>
+      </p:pic>
+      <p:pic>
+        <p:nvPicPr>
+          <p:cNvPr id="25" name="Picture 24" descr="A screenshot of a video game&#10;&#10;Description automatically generated">
+            <a:extLst>
+              <a:ext uri="{FF2B5EF4-FFF2-40B4-BE49-F238E27FC236}">
+                <a16:creationId xmlns:a16="http://schemas.microsoft.com/office/drawing/2014/main" id="{BDCA8EF5-6F09-0853-BC3D-A36AFA2B32D9}"/>
+              </a:ext>
+            </a:extLst>
+          </p:cNvPr>
+          <p:cNvPicPr>
+            <a:picLocks noChangeAspect="1"/>
+          </p:cNvPicPr>
+          <p:nvPr/>
+        </p:nvPicPr>
+        <p:blipFill>
+          <a:blip r:embed="rId4">
+            <a:extLst>
+              <a:ext uri="{28A0092B-C50C-407E-A947-70E740481C1C}">
+                <a14:useLocalDpi xmlns:a14="http://schemas.microsoft.com/office/drawing/2010/main" val="0"/>
+              </a:ext>
+            </a:extLst>
+          </a:blip>
+          <a:stretch>
+            <a:fillRect/>
+          </a:stretch>
+        </p:blipFill>
+        <p:spPr>
+          <a:xfrm>
+            <a:off x="5484870" y="3202542"/>
+            <a:ext cx="2288136" cy="3203390"/>
+          </a:xfrm>
+          <a:prstGeom prst="rect">
+            <a:avLst/>
+          </a:prstGeom>
+        </p:spPr>
+      </p:pic>
+      <p:pic>
+        <p:nvPicPr>
+          <p:cNvPr id="27" name="Picture 26" descr="A screenshot of a video game&#10;&#10;Description automatically generated">
+            <a:extLst>
+              <a:ext uri="{FF2B5EF4-FFF2-40B4-BE49-F238E27FC236}">
+                <a16:creationId xmlns:a16="http://schemas.microsoft.com/office/drawing/2014/main" id="{43DFED94-0B9E-1EDD-9260-FA189AC7A268}"/>
+              </a:ext>
+            </a:extLst>
+          </p:cNvPr>
+          <p:cNvPicPr>
+            <a:picLocks noChangeAspect="1"/>
+          </p:cNvPicPr>
+          <p:nvPr/>
+        </p:nvPicPr>
+        <p:blipFill>
+          <a:blip r:embed="rId5">
+            <a:extLst>
+              <a:ext uri="{28A0092B-C50C-407E-A947-70E740481C1C}">
+                <a14:useLocalDpi xmlns:a14="http://schemas.microsoft.com/office/drawing/2010/main" val="0"/>
+              </a:ext>
+            </a:extLst>
+          </a:blip>
+          <a:stretch>
+            <a:fillRect/>
+          </a:stretch>
+        </p:blipFill>
+        <p:spPr>
+          <a:xfrm>
+            <a:off x="3197340" y="3202542"/>
+            <a:ext cx="2287530" cy="3202542"/>
+          </a:xfrm>
+          <a:prstGeom prst="rect">
+            <a:avLst/>
+          </a:prstGeom>
+        </p:spPr>
+      </p:pic>
+      <p:pic>
+        <p:nvPicPr>
+          <p:cNvPr id="29" name="Picture 28" descr="A screenshot of a video game&#10;&#10;Description automatically generated">
+            <a:extLst>
+              <a:ext uri="{FF2B5EF4-FFF2-40B4-BE49-F238E27FC236}">
+                <a16:creationId xmlns:a16="http://schemas.microsoft.com/office/drawing/2014/main" id="{33D2D0D3-A05A-98AA-BF5D-47D0B647BD07}"/>
+              </a:ext>
+            </a:extLst>
+          </p:cNvPr>
+          <p:cNvPicPr>
+            <a:picLocks noChangeAspect="1"/>
+          </p:cNvPicPr>
+          <p:nvPr/>
+        </p:nvPicPr>
+        <p:blipFill>
+          <a:blip r:embed="rId6">
+            <a:extLst>
+              <a:ext uri="{28A0092B-C50C-407E-A947-70E740481C1C}">
+                <a14:useLocalDpi xmlns:a14="http://schemas.microsoft.com/office/drawing/2010/main" val="0"/>
+              </a:ext>
+            </a:extLst>
+          </a:blip>
+          <a:stretch>
+            <a:fillRect/>
+          </a:stretch>
+        </p:blipFill>
+        <p:spPr>
+          <a:xfrm>
+            <a:off x="909810" y="3202542"/>
+            <a:ext cx="2287530" cy="3202542"/>
+          </a:xfrm>
+          <a:prstGeom prst="rect">
+            <a:avLst/>
+          </a:prstGeom>
+        </p:spPr>
+      </p:pic>
+      <p:pic>
+        <p:nvPicPr>
+          <p:cNvPr id="31" name="Picture 30" descr="A screenshot of a video game&#10;&#10;Description automatically generated">
+            <a:extLst>
+              <a:ext uri="{FF2B5EF4-FFF2-40B4-BE49-F238E27FC236}">
+                <a16:creationId xmlns:a16="http://schemas.microsoft.com/office/drawing/2014/main" id="{FD068A05-0CAE-3F74-C62B-64E037181983}"/>
+              </a:ext>
+            </a:extLst>
+          </p:cNvPr>
+          <p:cNvPicPr>
+            <a:picLocks noChangeAspect="1"/>
+          </p:cNvPicPr>
+          <p:nvPr/>
+        </p:nvPicPr>
+        <p:blipFill>
+          <a:blip r:embed="rId7">
+            <a:extLst>
+              <a:ext uri="{28A0092B-C50C-407E-A947-70E740481C1C}">
+                <a14:useLocalDpi xmlns:a14="http://schemas.microsoft.com/office/drawing/2010/main" val="0"/>
+              </a:ext>
+            </a:extLst>
+          </a:blip>
+          <a:stretch>
+            <a:fillRect/>
+          </a:stretch>
+        </p:blipFill>
+        <p:spPr>
+          <a:xfrm>
+            <a:off x="5484870" y="6404236"/>
+            <a:ext cx="2288136" cy="3203390"/>
+          </a:xfrm>
+          <a:prstGeom prst="rect">
+            <a:avLst/>
+          </a:prstGeom>
+        </p:spPr>
+      </p:pic>
+      <p:pic>
+        <p:nvPicPr>
+          <p:cNvPr id="33" name="Picture 32" descr="A screenshot of a video game&#10;&#10;Description automatically generated">
+            <a:extLst>
+              <a:ext uri="{FF2B5EF4-FFF2-40B4-BE49-F238E27FC236}">
+                <a16:creationId xmlns:a16="http://schemas.microsoft.com/office/drawing/2014/main" id="{8D273216-2E8F-032A-4426-1B4539444FB8}"/>
+              </a:ext>
+            </a:extLst>
+          </p:cNvPr>
+          <p:cNvPicPr>
+            <a:picLocks noChangeAspect="1"/>
+          </p:cNvPicPr>
+          <p:nvPr/>
+        </p:nvPicPr>
+        <p:blipFill>
+          <a:blip r:embed="rId8">
+            <a:extLst>
+              <a:ext uri="{28A0092B-C50C-407E-A947-70E740481C1C}">
+                <a14:useLocalDpi xmlns:a14="http://schemas.microsoft.com/office/drawing/2010/main" val="0"/>
+              </a:ext>
+            </a:extLst>
+          </a:blip>
+          <a:stretch>
+            <a:fillRect/>
+          </a:stretch>
+        </p:blipFill>
+        <p:spPr>
+          <a:xfrm>
+            <a:off x="3197340" y="6404660"/>
+            <a:ext cx="2287530" cy="3202542"/>
+          </a:xfrm>
+          <a:prstGeom prst="rect">
+            <a:avLst/>
+          </a:prstGeom>
+        </p:spPr>
+      </p:pic>
+      <p:pic>
+        <p:nvPicPr>
+          <p:cNvPr id="35" name="Picture 34" descr="A screenshot of a video game&#10;&#10;Description automatically generated">
+            <a:extLst>
+              <a:ext uri="{FF2B5EF4-FFF2-40B4-BE49-F238E27FC236}">
+                <a16:creationId xmlns:a16="http://schemas.microsoft.com/office/drawing/2014/main" id="{DB281024-7CD5-B38E-6C34-FAB871305080}"/>
+              </a:ext>
+            </a:extLst>
+          </p:cNvPr>
+          <p:cNvPicPr>
+            <a:picLocks noChangeAspect="1"/>
+          </p:cNvPicPr>
+          <p:nvPr/>
+        </p:nvPicPr>
+        <p:blipFill>
+          <a:blip r:embed="rId9">
+            <a:extLst>
+              <a:ext uri="{28A0092B-C50C-407E-A947-70E740481C1C}">
+                <a14:useLocalDpi xmlns:a14="http://schemas.microsoft.com/office/drawing/2010/main" val="0"/>
+              </a:ext>
+            </a:extLst>
+          </a:blip>
+          <a:stretch>
+            <a:fillRect/>
+          </a:stretch>
+        </p:blipFill>
+        <p:spPr>
+          <a:xfrm>
+            <a:off x="909810" y="6404660"/>
+            <a:ext cx="2287530" cy="3202542"/>
+          </a:xfrm>
+          <a:prstGeom prst="rect">
+            <a:avLst/>
+          </a:prstGeom>
+        </p:spPr>
+      </p:pic>
     </p:spTree>
     <p:extLst>
       <p:ext uri="{BB962C8B-B14F-4D97-AF65-F5344CB8AC3E}">
@@ -6454,6 +7066,42 @@
       </p:grpSpPr>
       <p:pic>
         <p:nvPicPr>
+          <p:cNvPr id="3" name="Picture 2" descr="A screen shot of a video game&#10;&#10;Description automatically generated">
+            <a:extLst>
+              <a:ext uri="{FF2B5EF4-FFF2-40B4-BE49-F238E27FC236}">
+                <a16:creationId xmlns:a16="http://schemas.microsoft.com/office/drawing/2014/main" id="{6C2AC824-68F4-8EB5-E0B1-614EBFC13C5E}"/>
+              </a:ext>
+            </a:extLst>
+          </p:cNvPr>
+          <p:cNvPicPr>
+            <a:picLocks noChangeAspect="1"/>
+          </p:cNvPicPr>
+          <p:nvPr/>
+        </p:nvPicPr>
+        <p:blipFill>
+          <a:blip r:embed="rId2">
+            <a:extLst>
+              <a:ext uri="{28A0092B-C50C-407E-A947-70E740481C1C}">
+                <a14:useLocalDpi xmlns:a14="http://schemas.microsoft.com/office/drawing/2010/main" val="0"/>
+              </a:ext>
+            </a:extLst>
+          </a:blip>
+          <a:stretch>
+            <a:fillRect/>
+          </a:stretch>
+        </p:blipFill>
+        <p:spPr>
+          <a:xfrm>
+            <a:off x="0" y="0"/>
+            <a:ext cx="2286924" cy="3201694"/>
+          </a:xfrm>
+          <a:prstGeom prst="rect">
+            <a:avLst/>
+          </a:prstGeom>
+        </p:spPr>
+      </p:pic>
+      <p:pic>
+        <p:nvPicPr>
           <p:cNvPr id="5" name="Picture 4" descr="A screen shot of a game&#10;&#10;Description automatically generated">
             <a:extLst>
               <a:ext uri="{FF2B5EF4-FFF2-40B4-BE49-F238E27FC236}">
@@ -6467,7 +7115,7 @@
           <p:nvPr/>
         </p:nvPicPr>
         <p:blipFill>
-          <a:blip r:embed="rId2">
+          <a:blip r:embed="rId3">
             <a:extLst>
               <a:ext uri="{28A0092B-C50C-407E-A947-70E740481C1C}">
                 <a14:useLocalDpi xmlns:a14="http://schemas.microsoft.com/office/drawing/2010/main" val="0"/>
@@ -6503,7 +7151,7 @@
           <p:nvPr/>
         </p:nvPicPr>
         <p:blipFill>
-          <a:blip r:embed="rId2">
+          <a:blip r:embed="rId3">
             <a:extLst>
               <a:ext uri="{28A0092B-C50C-407E-A947-70E740481C1C}">
                 <a14:useLocalDpi xmlns:a14="http://schemas.microsoft.com/office/drawing/2010/main" val="0"/>
@@ -6539,7 +7187,7 @@
           <p:nvPr/>
         </p:nvPicPr>
         <p:blipFill>
-          <a:blip r:embed="rId2">
+          <a:blip r:embed="rId3">
             <a:extLst>
               <a:ext uri="{28A0092B-C50C-407E-A947-70E740481C1C}">
                 <a14:useLocalDpi xmlns:a14="http://schemas.microsoft.com/office/drawing/2010/main" val="0"/>
@@ -6575,7 +7223,7 @@
           <p:nvPr/>
         </p:nvPicPr>
         <p:blipFill>
-          <a:blip r:embed="rId2">
+          <a:blip r:embed="rId3">
             <a:extLst>
               <a:ext uri="{28A0092B-C50C-407E-A947-70E740481C1C}">
                 <a14:useLocalDpi xmlns:a14="http://schemas.microsoft.com/office/drawing/2010/main" val="0"/>
@@ -6611,7 +7259,7 @@
           <p:nvPr/>
         </p:nvPicPr>
         <p:blipFill>
-          <a:blip r:embed="rId2">
+          <a:blip r:embed="rId3">
             <a:extLst>
               <a:ext uri="{28A0092B-C50C-407E-A947-70E740481C1C}">
                 <a14:useLocalDpi xmlns:a14="http://schemas.microsoft.com/office/drawing/2010/main" val="0"/>
@@ -6647,7 +7295,7 @@
           <p:nvPr/>
         </p:nvPicPr>
         <p:blipFill>
-          <a:blip r:embed="rId2">
+          <a:blip r:embed="rId3">
             <a:extLst>
               <a:ext uri="{28A0092B-C50C-407E-A947-70E740481C1C}">
                 <a14:useLocalDpi xmlns:a14="http://schemas.microsoft.com/office/drawing/2010/main" val="0"/>
@@ -6683,7 +7331,7 @@
           <p:nvPr/>
         </p:nvPicPr>
         <p:blipFill>
-          <a:blip r:embed="rId2">
+          <a:blip r:embed="rId3">
             <a:extLst>
               <a:ext uri="{28A0092B-C50C-407E-A947-70E740481C1C}">
                 <a14:useLocalDpi xmlns:a14="http://schemas.microsoft.com/office/drawing/2010/main" val="0"/>
@@ -6719,7 +7367,7 @@
           <p:nvPr/>
         </p:nvPicPr>
         <p:blipFill>
-          <a:blip r:embed="rId2">
+          <a:blip r:embed="rId3">
             <a:extLst>
               <a:ext uri="{28A0092B-C50C-407E-A947-70E740481C1C}">
                 <a14:useLocalDpi xmlns:a14="http://schemas.microsoft.com/office/drawing/2010/main" val="0"/>
@@ -6733,42 +7381,6 @@
         <p:spPr>
           <a:xfrm>
             <a:off x="4573848" y="6403388"/>
-            <a:ext cx="2286924" cy="3201694"/>
-          </a:xfrm>
-          <a:prstGeom prst="rect">
-            <a:avLst/>
-          </a:prstGeom>
-        </p:spPr>
-      </p:pic>
-      <p:pic>
-        <p:nvPicPr>
-          <p:cNvPr id="4" name="Picture 3" descr="A screen shot of a game&#10;&#10;Description automatically generated">
-            <a:extLst>
-              <a:ext uri="{FF2B5EF4-FFF2-40B4-BE49-F238E27FC236}">
-                <a16:creationId xmlns:a16="http://schemas.microsoft.com/office/drawing/2014/main" id="{0DF2B6A8-705B-7996-0910-FDD0EE74EFCD}"/>
-              </a:ext>
-            </a:extLst>
-          </p:cNvPr>
-          <p:cNvPicPr>
-            <a:picLocks noChangeAspect="1"/>
-          </p:cNvPicPr>
-          <p:nvPr/>
-        </p:nvPicPr>
-        <p:blipFill>
-          <a:blip r:embed="rId2">
-            <a:extLst>
-              <a:ext uri="{28A0092B-C50C-407E-A947-70E740481C1C}">
-                <a14:useLocalDpi xmlns:a14="http://schemas.microsoft.com/office/drawing/2010/main" val="0"/>
-              </a:ext>
-            </a:extLst>
-          </a:blip>
-          <a:stretch>
-            <a:fillRect/>
-          </a:stretch>
-        </p:blipFill>
-        <p:spPr>
-          <a:xfrm>
-            <a:off x="0" y="7257"/>
             <a:ext cx="2286924" cy="3201694"/>
           </a:xfrm>
           <a:prstGeom prst="rect">
@@ -6779,7 +7391,7 @@
     </p:spTree>
     <p:extLst>
       <p:ext uri="{BB962C8B-B14F-4D97-AF65-F5344CB8AC3E}">
-        <p14:creationId xmlns:p14="http://schemas.microsoft.com/office/powerpoint/2010/main" val="2993288649"/>
+        <p14:creationId xmlns:p14="http://schemas.microsoft.com/office/powerpoint/2010/main" val="2426942407"/>
       </p:ext>
     </p:extLst>
   </p:cSld>
@@ -7052,6 +7664,78 @@
           <a:xfrm>
             <a:off x="926741" y="6401268"/>
             <a:ext cx="2287530" cy="3202542"/>
+          </a:xfrm>
+          <a:prstGeom prst="rect">
+            <a:avLst/>
+          </a:prstGeom>
+        </p:spPr>
+      </p:pic>
+      <p:pic>
+        <p:nvPicPr>
+          <p:cNvPr id="14" name="Picture 13" descr="A screenshot of a video game&#10;&#10;Description automatically generated">
+            <a:extLst>
+              <a:ext uri="{FF2B5EF4-FFF2-40B4-BE49-F238E27FC236}">
+                <a16:creationId xmlns:a16="http://schemas.microsoft.com/office/drawing/2014/main" id="{99FEAFAA-D4C5-855B-31C2-1366FA295466}"/>
+              </a:ext>
+            </a:extLst>
+          </p:cNvPr>
+          <p:cNvPicPr>
+            <a:picLocks noChangeAspect="1"/>
+          </p:cNvPicPr>
+          <p:nvPr/>
+        </p:nvPicPr>
+        <p:blipFill>
+          <a:blip r:embed="rId9">
+            <a:extLst>
+              <a:ext uri="{28A0092B-C50C-407E-A947-70E740481C1C}">
+                <a14:useLocalDpi xmlns:a14="http://schemas.microsoft.com/office/drawing/2010/main" val="0"/>
+              </a:ext>
+            </a:extLst>
+          </a:blip>
+          <a:stretch>
+            <a:fillRect/>
+          </a:stretch>
+        </p:blipFill>
+        <p:spPr>
+          <a:xfrm>
+            <a:off x="3216392" y="0"/>
+            <a:ext cx="2287530" cy="3202542"/>
+          </a:xfrm>
+          <a:prstGeom prst="rect">
+            <a:avLst/>
+          </a:prstGeom>
+        </p:spPr>
+      </p:pic>
+      <p:pic>
+        <p:nvPicPr>
+          <p:cNvPr id="16" name="Picture 15" descr="A screenshot of a video game&#10;&#10;Description automatically generated">
+            <a:extLst>
+              <a:ext uri="{FF2B5EF4-FFF2-40B4-BE49-F238E27FC236}">
+                <a16:creationId xmlns:a16="http://schemas.microsoft.com/office/drawing/2014/main" id="{4BD421D9-3D5A-A457-E0A8-CA55031D8FCB}"/>
+              </a:ext>
+            </a:extLst>
+          </p:cNvPr>
+          <p:cNvPicPr>
+            <a:picLocks noChangeAspect="1"/>
+          </p:cNvPicPr>
+          <p:nvPr/>
+        </p:nvPicPr>
+        <p:blipFill>
+          <a:blip r:embed="rId10">
+            <a:extLst>
+              <a:ext uri="{28A0092B-C50C-407E-A947-70E740481C1C}">
+                <a14:useLocalDpi xmlns:a14="http://schemas.microsoft.com/office/drawing/2010/main" val="0"/>
+              </a:ext>
+            </a:extLst>
+          </a:blip>
+          <a:stretch>
+            <a:fillRect/>
+          </a:stretch>
+        </p:blipFill>
+        <p:spPr>
+          <a:xfrm>
+            <a:off x="5503013" y="-2968"/>
+            <a:ext cx="2288136" cy="3203390"/>
           </a:xfrm>
           <a:prstGeom prst="rect">
             <a:avLst/>

</xml_diff>